<commit_message>
class presentation - final
</commit_message>
<xml_diff>
--- a/preach_prob.pptx
+++ b/preach_prob.pptx
@@ -5,7 +5,7 @@
     <p:sldMasterId id="2147483648" r:id="rId1"/>
   </p:sldMasterIdLst>
   <p:notesMasterIdLst>
-    <p:notesMasterId r:id="rId9"/>
+    <p:notesMasterId r:id="rId13"/>
   </p:notesMasterIdLst>
   <p:sldIdLst>
     <p:sldId id="256" r:id="rId2"/>
@@ -15,6 +15,10 @@
     <p:sldId id="263" r:id="rId6"/>
     <p:sldId id="264" r:id="rId7"/>
     <p:sldId id="265" r:id="rId8"/>
+    <p:sldId id="267" r:id="rId9"/>
+    <p:sldId id="266" r:id="rId10"/>
+    <p:sldId id="268" r:id="rId11"/>
+    <p:sldId id="269" r:id="rId12"/>
   </p:sldIdLst>
   <p:sldSz cx="9144000" cy="6858000" type="screen4x3"/>
   <p:notesSz cx="6858000" cy="9144000"/>
@@ -198,7 +202,7 @@
           <a:p>
             <a:fld id="{C85D0815-CA1F-40D4-A42C-2E7FBA5EFABD}" type="datetimeFigureOut">
               <a:rPr lang="en-US" smtClean="0"/>
-              <a:t>4/24/2014</a:t>
+              <a:t>4/25/2014</a:t>
             </a:fld>
             <a:endParaRPr lang="en-US"/>
           </a:p>
@@ -647,7 +651,7 @@
           <a:p>
             <a:fld id="{4589E42A-130F-4104-9A76-68CC149E4435}" type="datetime1">
               <a:rPr lang="en-US" smtClean="0"/>
-              <a:t>4/24/2014</a:t>
+              <a:t>4/25/2014</a:t>
             </a:fld>
             <a:endParaRPr lang="en-US"/>
           </a:p>
@@ -813,7 +817,7 @@
           <a:p>
             <a:fld id="{6110E5C1-1ABE-4312-9A06-D67CA92BFA37}" type="datetime1">
               <a:rPr lang="en-US" smtClean="0"/>
-              <a:t>4/24/2014</a:t>
+              <a:t>4/25/2014</a:t>
             </a:fld>
             <a:endParaRPr lang="en-US"/>
           </a:p>
@@ -989,7 +993,7 @@
           <a:p>
             <a:fld id="{FFD01A9A-B28D-4186-97EC-257B706A6F6A}" type="datetime1">
               <a:rPr lang="en-US" smtClean="0"/>
-              <a:t>4/24/2014</a:t>
+              <a:t>4/25/2014</a:t>
             </a:fld>
             <a:endParaRPr lang="en-US"/>
           </a:p>
@@ -1155,7 +1159,7 @@
           <a:p>
             <a:fld id="{B8305B86-8C5A-4A9D-8C99-D547467AA17B}" type="datetime1">
               <a:rPr lang="en-US" smtClean="0"/>
-              <a:t>4/24/2014</a:t>
+              <a:t>4/25/2014</a:t>
             </a:fld>
             <a:endParaRPr lang="en-US"/>
           </a:p>
@@ -1397,7 +1401,7 @@
           <a:p>
             <a:fld id="{2197EF27-972B-4DBB-A295-3D6E98A5B776}" type="datetime1">
               <a:rPr lang="en-US" smtClean="0"/>
-              <a:t>4/24/2014</a:t>
+              <a:t>4/25/2014</a:t>
             </a:fld>
             <a:endParaRPr lang="en-US"/>
           </a:p>
@@ -1681,7 +1685,7 @@
           <a:p>
             <a:fld id="{67565615-E8ED-4693-BB30-A48D56C1B8C0}" type="datetime1">
               <a:rPr lang="en-US" smtClean="0"/>
-              <a:t>4/24/2014</a:t>
+              <a:t>4/25/2014</a:t>
             </a:fld>
             <a:endParaRPr lang="en-US"/>
           </a:p>
@@ -2099,7 +2103,7 @@
           <a:p>
             <a:fld id="{171EA06A-6954-45FE-AED6-A1168F58AB66}" type="datetime1">
               <a:rPr lang="en-US" smtClean="0"/>
-              <a:t>4/24/2014</a:t>
+              <a:t>4/25/2014</a:t>
             </a:fld>
             <a:endParaRPr lang="en-US"/>
           </a:p>
@@ -2213,7 +2217,7 @@
           <a:p>
             <a:fld id="{FCBCFB04-6F87-4F88-A556-2F87C9369F9D}" type="datetime1">
               <a:rPr lang="en-US" smtClean="0"/>
-              <a:t>4/24/2014</a:t>
+              <a:t>4/25/2014</a:t>
             </a:fld>
             <a:endParaRPr lang="en-US"/>
           </a:p>
@@ -2304,7 +2308,7 @@
           <a:p>
             <a:fld id="{2B7C63F7-C824-409A-8749-D94CCF676D6C}" type="datetime1">
               <a:rPr lang="en-US" smtClean="0"/>
-              <a:t>4/24/2014</a:t>
+              <a:t>4/25/2014</a:t>
             </a:fld>
             <a:endParaRPr lang="en-US"/>
           </a:p>
@@ -2577,7 +2581,7 @@
           <a:p>
             <a:fld id="{D2A8B740-4061-4A24-9FB9-E74D877DFE4D}" type="datetime1">
               <a:rPr lang="en-US" smtClean="0"/>
-              <a:t>4/24/2014</a:t>
+              <a:t>4/25/2014</a:t>
             </a:fld>
             <a:endParaRPr lang="en-US"/>
           </a:p>
@@ -2826,7 +2830,7 @@
           <a:p>
             <a:fld id="{E7E3B07F-5BFD-4DB4-AFAB-5D8AC4B9AB45}" type="datetime1">
               <a:rPr lang="en-US" smtClean="0"/>
-              <a:t>4/24/2014</a:t>
+              <a:t>4/25/2014</a:t>
             </a:fld>
             <a:endParaRPr lang="en-US"/>
           </a:p>
@@ -3054,7 +3058,7 @@
           <a:p>
             <a:fld id="{F92420FE-8629-40C8-AB32-D8982441EFF4}" type="datetime1">
               <a:rPr lang="en-US" smtClean="0"/>
-              <a:t>4/24/2014</a:t>
+              <a:t>4/25/2014</a:t>
             </a:fld>
             <a:endParaRPr lang="en-US"/>
           </a:p>
@@ -3611,6 +3615,331 @@
 </p:sld>
 </file>
 
+<file path=ppt/slides/slide10.xml><?xml version="1.0" encoding="utf-8"?>
+<p:sld xmlns:a="http://schemas.openxmlformats.org/drawingml/2006/main" xmlns:r="http://schemas.openxmlformats.org/officeDocument/2006/relationships" xmlns:p="http://schemas.openxmlformats.org/presentationml/2006/main">
+  <p:cSld>
+    <p:spTree>
+      <p:nvGrpSpPr>
+        <p:cNvPr id="1" name=""/>
+        <p:cNvGrpSpPr/>
+        <p:nvPr/>
+      </p:nvGrpSpPr>
+      <p:grpSpPr>
+        <a:xfrm>
+          <a:off x="0" y="0"/>
+          <a:ext cx="0" cy="0"/>
+          <a:chOff x="0" y="0"/>
+          <a:chExt cx="0" cy="0"/>
+        </a:xfrm>
+      </p:grpSpPr>
+      <p:sp>
+        <p:nvSpPr>
+          <p:cNvPr id="2" name="Title 1"/>
+          <p:cNvSpPr>
+            <a:spLocks noGrp="1"/>
+          </p:cNvSpPr>
+          <p:nvPr>
+            <p:ph type="title"/>
+          </p:nvPr>
+        </p:nvSpPr>
+        <p:spPr>
+          <a:xfrm>
+            <a:off x="0" y="274638"/>
+            <a:ext cx="9144000" cy="944562"/>
+          </a:xfrm>
+          <a:solidFill>
+            <a:srgbClr val="002060"/>
+          </a:solidFill>
+        </p:spPr>
+        <p:txBody>
+          <a:bodyPr/>
+          <a:lstStyle/>
+          <a:p>
+            <a:r>
+              <a:rPr lang="en-US" dirty="0" smtClean="0">
+                <a:solidFill>
+                  <a:schemeClr val="bg1"/>
+                </a:solidFill>
+              </a:rPr>
+              <a:t>Results</a:t>
+            </a:r>
+            <a:endParaRPr lang="en-US" dirty="0">
+              <a:solidFill>
+                <a:schemeClr val="bg1"/>
+              </a:solidFill>
+            </a:endParaRPr>
+          </a:p>
+        </p:txBody>
+      </p:sp>
+      <p:sp>
+        <p:nvSpPr>
+          <p:cNvPr id="3" name="Content Placeholder 2"/>
+          <p:cNvSpPr>
+            <a:spLocks noGrp="1"/>
+          </p:cNvSpPr>
+          <p:nvPr>
+            <p:ph idx="1"/>
+          </p:nvPr>
+        </p:nvSpPr>
+        <p:spPr>
+          <a:xfrm>
+            <a:off x="457200" y="1447800"/>
+            <a:ext cx="8229600" cy="5105400"/>
+          </a:xfrm>
+          <a:solidFill>
+            <a:schemeClr val="bg1">
+              <a:alpha val="40000"/>
+            </a:schemeClr>
+          </a:solidFill>
+        </p:spPr>
+        <p:txBody>
+          <a:bodyPr/>
+          <a:lstStyle/>
+          <a:p>
+            <a:r>
+              <a:rPr lang="en-US" dirty="0" smtClean="0"/>
+              <a:t>Observations about results from synthetic expressions on </a:t>
+            </a:r>
+            <a:r>
+              <a:rPr lang="en-US" smtClean="0"/>
+              <a:t>ErbB:</a:t>
+            </a:r>
+            <a:endParaRPr lang="en-US" dirty="0" smtClean="0"/>
+          </a:p>
+          <a:p>
+            <a:pPr lvl="1"/>
+            <a:r>
+              <a:rPr lang="en-US" dirty="0" smtClean="0"/>
+              <a:t>Multiple solutions, same quality.</a:t>
+            </a:r>
+          </a:p>
+          <a:p>
+            <a:pPr lvl="1"/>
+            <a:r>
+              <a:rPr lang="en-US" dirty="0" smtClean="0"/>
+              <a:t>Quality value is rather high (&gt;96%).</a:t>
+            </a:r>
+          </a:p>
+          <a:p>
+            <a:pPr lvl="1"/>
+            <a:r>
+              <a:rPr lang="en-US" dirty="0" smtClean="0"/>
+              <a:t>Removal of genetic phase has no effect.</a:t>
+            </a:r>
+          </a:p>
+          <a:p>
+            <a:pPr lvl="1"/>
+            <a:r>
+              <a:rPr lang="en-US" dirty="0" smtClean="0"/>
+              <a:t>Many zero values in the output.</a:t>
+            </a:r>
+            <a:endParaRPr lang="en-US" dirty="0"/>
+          </a:p>
+        </p:txBody>
+      </p:sp>
+      <p:sp>
+        <p:nvSpPr>
+          <p:cNvPr id="5" name="Slide Number Placeholder 4"/>
+          <p:cNvSpPr>
+            <a:spLocks noGrp="1"/>
+          </p:cNvSpPr>
+          <p:nvPr>
+            <p:ph type="sldNum" sz="quarter" idx="12"/>
+          </p:nvPr>
+        </p:nvSpPr>
+        <p:spPr>
+          <a:xfrm>
+            <a:off x="6553200" y="6492875"/>
+            <a:ext cx="2133600" cy="365125"/>
+          </a:xfrm>
+        </p:spPr>
+        <p:txBody>
+          <a:bodyPr/>
+          <a:lstStyle/>
+          <a:p>
+            <a:fld id="{B6F15528-21DE-4FAA-801E-634DDDAF4B2B}" type="slidenum">
+              <a:rPr lang="en-US" smtClean="0">
+                <a:solidFill>
+                  <a:srgbClr val="002060"/>
+                </a:solidFill>
+              </a:rPr>
+              <a:pPr/>
+              <a:t>10</a:t>
+            </a:fld>
+            <a:endParaRPr lang="en-US" dirty="0">
+              <a:solidFill>
+                <a:srgbClr val="002060"/>
+              </a:solidFill>
+            </a:endParaRPr>
+          </a:p>
+        </p:txBody>
+      </p:sp>
+    </p:spTree>
+    <p:extLst>
+      <p:ext uri="{BB962C8B-B14F-4D97-AF65-F5344CB8AC3E}">
+        <p14:creationId xmlns:p14="http://schemas.microsoft.com/office/powerpoint/2010/main" val="3539377952"/>
+      </p:ext>
+    </p:extLst>
+  </p:cSld>
+  <p:clrMapOvr>
+    <a:masterClrMapping/>
+  </p:clrMapOvr>
+  <p:timing>
+    <p:tnLst>
+      <p:par>
+        <p:cTn id="1" dur="indefinite" restart="never" nodeType="tmRoot"/>
+      </p:par>
+    </p:tnLst>
+  </p:timing>
+</p:sld>
+</file>
+
+<file path=ppt/slides/slide11.xml><?xml version="1.0" encoding="utf-8"?>
+<p:sld xmlns:a="http://schemas.openxmlformats.org/drawingml/2006/main" xmlns:r="http://schemas.openxmlformats.org/officeDocument/2006/relationships" xmlns:p="http://schemas.openxmlformats.org/presentationml/2006/main">
+  <p:cSld>
+    <p:spTree>
+      <p:nvGrpSpPr>
+        <p:cNvPr id="1" name=""/>
+        <p:cNvGrpSpPr/>
+        <p:nvPr/>
+      </p:nvGrpSpPr>
+      <p:grpSpPr>
+        <a:xfrm>
+          <a:off x="0" y="0"/>
+          <a:ext cx="0" cy="0"/>
+          <a:chOff x="0" y="0"/>
+          <a:chExt cx="0" cy="0"/>
+        </a:xfrm>
+      </p:grpSpPr>
+      <p:sp>
+        <p:nvSpPr>
+          <p:cNvPr id="2" name="Title 1"/>
+          <p:cNvSpPr>
+            <a:spLocks noGrp="1"/>
+          </p:cNvSpPr>
+          <p:nvPr>
+            <p:ph type="title"/>
+          </p:nvPr>
+        </p:nvSpPr>
+        <p:spPr>
+          <a:xfrm>
+            <a:off x="0" y="274638"/>
+            <a:ext cx="9144000" cy="944562"/>
+          </a:xfrm>
+          <a:solidFill>
+            <a:srgbClr val="002060"/>
+          </a:solidFill>
+        </p:spPr>
+        <p:txBody>
+          <a:bodyPr/>
+          <a:lstStyle/>
+          <a:p>
+            <a:r>
+              <a:rPr lang="en-US" dirty="0" smtClean="0">
+                <a:solidFill>
+                  <a:schemeClr val="bg1"/>
+                </a:solidFill>
+              </a:rPr>
+              <a:t>Thank you</a:t>
+            </a:r>
+            <a:endParaRPr lang="en-US" dirty="0">
+              <a:solidFill>
+                <a:schemeClr val="bg1"/>
+              </a:solidFill>
+            </a:endParaRPr>
+          </a:p>
+        </p:txBody>
+      </p:sp>
+      <p:sp>
+        <p:nvSpPr>
+          <p:cNvPr id="3" name="Content Placeholder 2"/>
+          <p:cNvSpPr>
+            <a:spLocks noGrp="1"/>
+          </p:cNvSpPr>
+          <p:nvPr>
+            <p:ph idx="1"/>
+          </p:nvPr>
+        </p:nvSpPr>
+        <p:spPr>
+          <a:xfrm>
+            <a:off x="457200" y="1447800"/>
+            <a:ext cx="8229600" cy="5105400"/>
+          </a:xfrm>
+          <a:solidFill>
+            <a:schemeClr val="bg1">
+              <a:alpha val="40000"/>
+            </a:schemeClr>
+          </a:solidFill>
+        </p:spPr>
+        <p:txBody>
+          <a:bodyPr/>
+          <a:lstStyle/>
+          <a:p>
+            <a:r>
+              <a:rPr lang="en-US" dirty="0" smtClean="0"/>
+              <a:t>Questions?</a:t>
+            </a:r>
+            <a:endParaRPr lang="en-US" dirty="0"/>
+          </a:p>
+        </p:txBody>
+      </p:sp>
+      <p:sp>
+        <p:nvSpPr>
+          <p:cNvPr id="5" name="Slide Number Placeholder 4"/>
+          <p:cNvSpPr>
+            <a:spLocks noGrp="1"/>
+          </p:cNvSpPr>
+          <p:nvPr>
+            <p:ph type="sldNum" sz="quarter" idx="12"/>
+          </p:nvPr>
+        </p:nvSpPr>
+        <p:spPr>
+          <a:xfrm>
+            <a:off x="6553200" y="6492875"/>
+            <a:ext cx="2133600" cy="365125"/>
+          </a:xfrm>
+        </p:spPr>
+        <p:txBody>
+          <a:bodyPr/>
+          <a:lstStyle/>
+          <a:p>
+            <a:fld id="{B6F15528-21DE-4FAA-801E-634DDDAF4B2B}" type="slidenum">
+              <a:rPr lang="en-US" smtClean="0">
+                <a:solidFill>
+                  <a:srgbClr val="002060"/>
+                </a:solidFill>
+              </a:rPr>
+              <a:pPr/>
+              <a:t>11</a:t>
+            </a:fld>
+            <a:endParaRPr lang="en-US" dirty="0">
+              <a:solidFill>
+                <a:srgbClr val="002060"/>
+              </a:solidFill>
+            </a:endParaRPr>
+          </a:p>
+        </p:txBody>
+      </p:sp>
+    </p:spTree>
+    <p:extLst>
+      <p:ext uri="{BB962C8B-B14F-4D97-AF65-F5344CB8AC3E}">
+        <p14:creationId xmlns:p14="http://schemas.microsoft.com/office/powerpoint/2010/main" val="3433388755"/>
+      </p:ext>
+    </p:extLst>
+  </p:cSld>
+  <p:clrMapOvr>
+    <a:masterClrMapping/>
+  </p:clrMapOvr>
+  <p:timing>
+    <p:tnLst>
+      <p:par>
+        <p:cTn id="1" dur="indefinite" restart="never" nodeType="tmRoot"/>
+      </p:par>
+    </p:tnLst>
+  </p:timing>
+</p:sld>
+</file>
+
 <file path=ppt/slides/slide2.xml><?xml version="1.0" encoding="utf-8"?>
 <p:sld xmlns:a="http://schemas.openxmlformats.org/drawingml/2006/main" xmlns:r="http://schemas.openxmlformats.org/officeDocument/2006/relationships" xmlns:p="http://schemas.openxmlformats.org/presentationml/2006/main">
   <p:cSld>
@@ -4530,8 +4859,8 @@
           </a:p>
         </p:txBody>
       </p:sp>
-      <mc:AlternateContent xmlns:mc="http://schemas.openxmlformats.org/markup-compatibility/2006">
-        <mc:Choice xmlns:a14="http://schemas.microsoft.com/office/drawing/2010/main" Requires="a14">
+      <mc:AlternateContent xmlns:mc="http://schemas.openxmlformats.org/markup-compatibility/2006" xmlns:a14="http://schemas.microsoft.com/office/drawing/2010/main">
+        <mc:Choice Requires="a14">
           <p:sp>
             <p:nvSpPr>
               <p:cNvPr id="3" name="Content Placeholder 2"/>
@@ -4687,7 +5016,7 @@
             </p:txBody>
           </p:sp>
         </mc:Choice>
-        <mc:Fallback>
+        <mc:Fallback xmlns="">
           <p:sp>
             <p:nvSpPr>
               <p:cNvPr id="3" name="Content Placeholder 2"/>
@@ -4838,8 +5167,8 @@
           </a:p>
         </p:txBody>
       </p:sp>
-      <mc:AlternateContent xmlns:mc="http://schemas.openxmlformats.org/markup-compatibility/2006">
-        <mc:Choice xmlns:a14="http://schemas.microsoft.com/office/drawing/2010/main" Requires="a14">
+      <mc:AlternateContent xmlns:mc="http://schemas.openxmlformats.org/markup-compatibility/2006" xmlns:a14="http://schemas.microsoft.com/office/drawing/2010/main">
+        <mc:Choice Requires="a14">
           <p:sp>
             <p:nvSpPr>
               <p:cNvPr id="3" name="Content Placeholder 2"/>
@@ -4953,7 +5282,7 @@
                         <a:latin typeface="Cambria Math"/>
                         <a:ea typeface="Cambria Math"/>
                       </a:rPr>
-                      <m:t>-</m:t>
+                      <m:t>−</m:t>
                     </m:r>
                     <m:r>
                       <m:rPr>
@@ -5035,7 +5364,7 @@
             </p:txBody>
           </p:sp>
         </mc:Choice>
-        <mc:Fallback>
+        <mc:Fallback xmlns="">
           <p:sp>
             <p:nvSpPr>
               <p:cNvPr id="3" name="Content Placeholder 2"/>
@@ -5114,6 +5443,365 @@
     <p:extLst>
       <p:ext uri="{BB962C8B-B14F-4D97-AF65-F5344CB8AC3E}">
         <p14:creationId xmlns:p14="http://schemas.microsoft.com/office/powerpoint/2010/main" val="470409799"/>
+      </p:ext>
+    </p:extLst>
+  </p:cSld>
+  <p:clrMapOvr>
+    <a:masterClrMapping/>
+  </p:clrMapOvr>
+  <p:timing>
+    <p:tnLst>
+      <p:par>
+        <p:cTn id="1" dur="indefinite" restart="never" nodeType="tmRoot"/>
+      </p:par>
+    </p:tnLst>
+  </p:timing>
+</p:sld>
+</file>
+
+<file path=ppt/slides/slide8.xml><?xml version="1.0" encoding="utf-8"?>
+<p:sld xmlns:a="http://schemas.openxmlformats.org/drawingml/2006/main" xmlns:r="http://schemas.openxmlformats.org/officeDocument/2006/relationships" xmlns:p="http://schemas.openxmlformats.org/presentationml/2006/main">
+  <p:cSld>
+    <p:spTree>
+      <p:nvGrpSpPr>
+        <p:cNvPr id="1" name=""/>
+        <p:cNvGrpSpPr/>
+        <p:nvPr/>
+      </p:nvGrpSpPr>
+      <p:grpSpPr>
+        <a:xfrm>
+          <a:off x="0" y="0"/>
+          <a:ext cx="0" cy="0"/>
+          <a:chOff x="0" y="0"/>
+          <a:chExt cx="0" cy="0"/>
+        </a:xfrm>
+      </p:grpSpPr>
+      <p:sp>
+        <p:nvSpPr>
+          <p:cNvPr id="2" name="Title 1"/>
+          <p:cNvSpPr>
+            <a:spLocks noGrp="1"/>
+          </p:cNvSpPr>
+          <p:nvPr>
+            <p:ph type="title"/>
+          </p:nvPr>
+        </p:nvSpPr>
+        <p:spPr>
+          <a:xfrm>
+            <a:off x="0" y="274638"/>
+            <a:ext cx="9144000" cy="944562"/>
+          </a:xfrm>
+          <a:solidFill>
+            <a:srgbClr val="002060"/>
+          </a:solidFill>
+        </p:spPr>
+        <p:txBody>
+          <a:bodyPr/>
+          <a:lstStyle/>
+          <a:p>
+            <a:r>
+              <a:rPr lang="en-US" dirty="0" smtClean="0">
+                <a:solidFill>
+                  <a:schemeClr val="bg1"/>
+                </a:solidFill>
+              </a:rPr>
+              <a:t>Datasets</a:t>
+            </a:r>
+            <a:endParaRPr lang="en-US" dirty="0">
+              <a:solidFill>
+                <a:schemeClr val="bg1"/>
+              </a:solidFill>
+            </a:endParaRPr>
+          </a:p>
+        </p:txBody>
+      </p:sp>
+      <p:sp>
+        <p:nvSpPr>
+          <p:cNvPr id="3" name="Content Placeholder 2"/>
+          <p:cNvSpPr>
+            <a:spLocks noGrp="1"/>
+          </p:cNvSpPr>
+          <p:nvPr>
+            <p:ph idx="1"/>
+          </p:nvPr>
+        </p:nvSpPr>
+        <p:spPr>
+          <a:xfrm>
+            <a:off x="457200" y="1447800"/>
+            <a:ext cx="8229600" cy="5105400"/>
+          </a:xfrm>
+          <a:solidFill>
+            <a:schemeClr val="bg1">
+              <a:alpha val="40000"/>
+            </a:schemeClr>
+          </a:solidFill>
+        </p:spPr>
+        <p:txBody>
+          <a:bodyPr/>
+          <a:lstStyle/>
+          <a:p>
+            <a:r>
+              <a:rPr lang="en-US" dirty="0" smtClean="0"/>
+              <a:t>Networks: H. sapiens signaling networks from KEGG</a:t>
+            </a:r>
+          </a:p>
+          <a:p>
+            <a:r>
+              <a:rPr lang="en-US" dirty="0" smtClean="0"/>
+              <a:t>Gene expression data: random synthetic </a:t>
+            </a:r>
+            <a:r>
+              <a:rPr lang="en-US" dirty="0" err="1" smtClean="0"/>
+              <a:t>vlaues</a:t>
+            </a:r>
+            <a:r>
+              <a:rPr lang="en-US" dirty="0" smtClean="0"/>
+              <a:t>.</a:t>
+            </a:r>
+          </a:p>
+          <a:p>
+            <a:r>
+              <a:rPr lang="en-US" dirty="0" smtClean="0"/>
+              <a:t>Projected to use with real gene expression data for different Leukemia subtypes.</a:t>
+            </a:r>
+            <a:endParaRPr lang="en-US" dirty="0"/>
+          </a:p>
+        </p:txBody>
+      </p:sp>
+      <p:sp>
+        <p:nvSpPr>
+          <p:cNvPr id="5" name="Slide Number Placeholder 4"/>
+          <p:cNvSpPr>
+            <a:spLocks noGrp="1"/>
+          </p:cNvSpPr>
+          <p:nvPr>
+            <p:ph type="sldNum" sz="quarter" idx="12"/>
+          </p:nvPr>
+        </p:nvSpPr>
+        <p:spPr>
+          <a:xfrm>
+            <a:off x="6553200" y="6492875"/>
+            <a:ext cx="2133600" cy="365125"/>
+          </a:xfrm>
+        </p:spPr>
+        <p:txBody>
+          <a:bodyPr/>
+          <a:lstStyle/>
+          <a:p>
+            <a:fld id="{B6F15528-21DE-4FAA-801E-634DDDAF4B2B}" type="slidenum">
+              <a:rPr lang="en-US" smtClean="0">
+                <a:solidFill>
+                  <a:srgbClr val="002060"/>
+                </a:solidFill>
+              </a:rPr>
+              <a:pPr/>
+              <a:t>8</a:t>
+            </a:fld>
+            <a:endParaRPr lang="en-US" dirty="0">
+              <a:solidFill>
+                <a:srgbClr val="002060"/>
+              </a:solidFill>
+            </a:endParaRPr>
+          </a:p>
+        </p:txBody>
+      </p:sp>
+    </p:spTree>
+    <p:extLst>
+      <p:ext uri="{BB962C8B-B14F-4D97-AF65-F5344CB8AC3E}">
+        <p14:creationId xmlns:p14="http://schemas.microsoft.com/office/powerpoint/2010/main" val="3040430754"/>
+      </p:ext>
+    </p:extLst>
+  </p:cSld>
+  <p:clrMapOvr>
+    <a:masterClrMapping/>
+  </p:clrMapOvr>
+  <p:timing>
+    <p:tnLst>
+      <p:par>
+        <p:cTn id="1" dur="indefinite" restart="never" nodeType="tmRoot"/>
+      </p:par>
+    </p:tnLst>
+  </p:timing>
+</p:sld>
+</file>
+
+<file path=ppt/slides/slide9.xml><?xml version="1.0" encoding="utf-8"?>
+<p:sld xmlns:a="http://schemas.openxmlformats.org/drawingml/2006/main" xmlns:r="http://schemas.openxmlformats.org/officeDocument/2006/relationships" xmlns:p="http://schemas.openxmlformats.org/presentationml/2006/main">
+  <p:cSld>
+    <p:spTree>
+      <p:nvGrpSpPr>
+        <p:cNvPr id="1" name=""/>
+        <p:cNvGrpSpPr/>
+        <p:nvPr/>
+      </p:nvGrpSpPr>
+      <p:grpSpPr>
+        <a:xfrm>
+          <a:off x="0" y="0"/>
+          <a:ext cx="0" cy="0"/>
+          <a:chOff x="0" y="0"/>
+          <a:chExt cx="0" cy="0"/>
+        </a:xfrm>
+      </p:grpSpPr>
+      <p:sp>
+        <p:nvSpPr>
+          <p:cNvPr id="2" name="Title 1"/>
+          <p:cNvSpPr>
+            <a:spLocks noGrp="1"/>
+          </p:cNvSpPr>
+          <p:nvPr>
+            <p:ph type="title"/>
+          </p:nvPr>
+        </p:nvSpPr>
+        <p:spPr>
+          <a:xfrm>
+            <a:off x="0" y="274638"/>
+            <a:ext cx="9144000" cy="944562"/>
+          </a:xfrm>
+          <a:solidFill>
+            <a:srgbClr val="002060"/>
+          </a:solidFill>
+        </p:spPr>
+        <p:txBody>
+          <a:bodyPr/>
+          <a:lstStyle/>
+          <a:p>
+            <a:r>
+              <a:rPr lang="en-US" dirty="0" smtClean="0">
+                <a:solidFill>
+                  <a:schemeClr val="bg1"/>
+                </a:solidFill>
+              </a:rPr>
+              <a:t>Results</a:t>
+            </a:r>
+            <a:endParaRPr lang="en-US" dirty="0">
+              <a:solidFill>
+                <a:schemeClr val="bg1"/>
+              </a:solidFill>
+            </a:endParaRPr>
+          </a:p>
+        </p:txBody>
+      </p:sp>
+      <p:sp>
+        <p:nvSpPr>
+          <p:cNvPr id="3" name="Content Placeholder 2"/>
+          <p:cNvSpPr>
+            <a:spLocks noGrp="1"/>
+          </p:cNvSpPr>
+          <p:nvPr>
+            <p:ph idx="1"/>
+          </p:nvPr>
+        </p:nvSpPr>
+        <p:spPr>
+          <a:xfrm>
+            <a:off x="457200" y="1447800"/>
+            <a:ext cx="8229600" cy="5105400"/>
+          </a:xfrm>
+          <a:solidFill>
+            <a:schemeClr val="bg1">
+              <a:alpha val="40000"/>
+            </a:schemeClr>
+          </a:solidFill>
+        </p:spPr>
+        <p:txBody>
+          <a:bodyPr/>
+          <a:lstStyle/>
+          <a:p>
+            <a:r>
+              <a:rPr lang="en-US" dirty="0" smtClean="0"/>
+              <a:t>Running times (100 genetic rounds + hill climbing):</a:t>
+            </a:r>
+          </a:p>
+          <a:p>
+            <a:pPr lvl="1"/>
+            <a:r>
+              <a:rPr lang="en-US" dirty="0" err="1" smtClean="0"/>
+              <a:t>ErbB</a:t>
+            </a:r>
+            <a:r>
+              <a:rPr lang="en-US" dirty="0" smtClean="0"/>
+              <a:t>: 82 seconds</a:t>
+            </a:r>
+          </a:p>
+          <a:p>
+            <a:pPr lvl="1"/>
+            <a:r>
+              <a:rPr lang="en-US" dirty="0" err="1" smtClean="0"/>
+              <a:t>Wnt</a:t>
+            </a:r>
+            <a:r>
+              <a:rPr lang="en-US" dirty="0" smtClean="0"/>
+              <a:t>: 95 seconds</a:t>
+            </a:r>
+          </a:p>
+          <a:p>
+            <a:pPr lvl="1"/>
+            <a:r>
+              <a:rPr lang="en-US" dirty="0" smtClean="0"/>
+              <a:t>MAPK: </a:t>
+            </a:r>
+          </a:p>
+          <a:p>
+            <a:pPr lvl="2"/>
+            <a:r>
+              <a:rPr lang="en-US" dirty="0" smtClean="0"/>
+              <a:t>After 10 minutes, first genetic round didn’t finish.</a:t>
+            </a:r>
+          </a:p>
+          <a:p>
+            <a:pPr lvl="2"/>
+            <a:r>
+              <a:rPr lang="en-US" dirty="0" smtClean="0"/>
+              <a:t>Removing genetic phase, </a:t>
+            </a:r>
+            <a:r>
+              <a:rPr lang="en-US" dirty="0" smtClean="0"/>
+              <a:t>also first hill climbing round does not finish.</a:t>
+            </a:r>
+            <a:endParaRPr lang="en-US" dirty="0"/>
+          </a:p>
+        </p:txBody>
+      </p:sp>
+      <p:sp>
+        <p:nvSpPr>
+          <p:cNvPr id="5" name="Slide Number Placeholder 4"/>
+          <p:cNvSpPr>
+            <a:spLocks noGrp="1"/>
+          </p:cNvSpPr>
+          <p:nvPr>
+            <p:ph type="sldNum" sz="quarter" idx="12"/>
+          </p:nvPr>
+        </p:nvSpPr>
+        <p:spPr>
+          <a:xfrm>
+            <a:off x="6553200" y="6492875"/>
+            <a:ext cx="2133600" cy="365125"/>
+          </a:xfrm>
+        </p:spPr>
+        <p:txBody>
+          <a:bodyPr/>
+          <a:lstStyle/>
+          <a:p>
+            <a:fld id="{B6F15528-21DE-4FAA-801E-634DDDAF4B2B}" type="slidenum">
+              <a:rPr lang="en-US" smtClean="0">
+                <a:solidFill>
+                  <a:srgbClr val="002060"/>
+                </a:solidFill>
+              </a:rPr>
+              <a:pPr/>
+              <a:t>9</a:t>
+            </a:fld>
+            <a:endParaRPr lang="en-US" dirty="0">
+              <a:solidFill>
+                <a:srgbClr val="002060"/>
+              </a:solidFill>
+            </a:endParaRPr>
+          </a:p>
+        </p:txBody>
+      </p:sp>
+    </p:spTree>
+    <p:extLst>
+      <p:ext uri="{BB962C8B-B14F-4D97-AF65-F5344CB8AC3E}">
+        <p14:creationId xmlns:p14="http://schemas.microsoft.com/office/powerpoint/2010/main" val="1067593708"/>
       </p:ext>
     </p:extLst>
   </p:cSld>

</xml_diff>